<commit_message>
With corrections in DEREF
</commit_message>
<xml_diff>
--- a/CSE-3104/Slides/Introduction_to_modern_databases.pptx
+++ b/CSE-3104/Slides/Introduction_to_modern_databases.pptx
@@ -300,7 +300,7 @@
       </p15:sldGuideLst>
     </p:ext>
     <p:ext uri="GoogleSlidesCustomDataVersion2">
-      <go:slidesCustomData xmlns:go="http://customooxmlschemas.google.com/" r:id="rId46" roundtripDataSignature="AMtx7mgmBVq2Ct1xGoViKvK1BYtfuQ8Qww=="/>
+      <go:slidesCustomData xmlns:go="http://customooxmlschemas.google.com/" r:id="rId46" roundtripDataSignature="AMtx7miIK3VfbUU7snDkqKogbCvQJeSY6A=="/>
     </p:ext>
   </p:extLst>
 </p:presentation>
@@ -1232,7 +1232,7 @@
   <p:cSld>
     <p:spTree>
       <p:nvGrpSpPr>
-        <p:cNvPr id="179" name="Shape 179"/>
+        <p:cNvPr id="180" name="Shape 180"/>
         <p:cNvGrpSpPr/>
         <p:nvPr/>
       </p:nvGrpSpPr>
@@ -1246,7 +1246,7 @@
       </p:grpSpPr>
       <p:sp>
         <p:nvSpPr>
-          <p:cNvPr id="180" name="Google Shape;180;g369690b03c5_0_206:notes"/>
+          <p:cNvPr id="181" name="Google Shape;181;g369690b03c5_0_206:notes"/>
           <p:cNvSpPr/>
           <p:nvPr>
             <p:ph idx="2" type="sldImg"/>
@@ -1281,7 +1281,7 @@
       </p:sp>
       <p:sp>
         <p:nvSpPr>
-          <p:cNvPr id="181" name="Google Shape;181;g369690b03c5_0_206:notes"/>
+          <p:cNvPr id="182" name="Google Shape;182;g369690b03c5_0_206:notes"/>
           <p:cNvSpPr txBox="1"/>
           <p:nvPr>
             <p:ph idx="1" type="body"/>
@@ -1331,7 +1331,7 @@
   <p:cSld>
     <p:spTree>
       <p:nvGrpSpPr>
-        <p:cNvPr id="190" name="Shape 190"/>
+        <p:cNvPr id="191" name="Shape 191"/>
         <p:cNvGrpSpPr/>
         <p:nvPr/>
       </p:nvGrpSpPr>
@@ -1345,7 +1345,7 @@
       </p:grpSpPr>
       <p:sp>
         <p:nvSpPr>
-          <p:cNvPr id="191" name="Google Shape;191;g369690b03c5_0_217:notes"/>
+          <p:cNvPr id="192" name="Google Shape;192;g369690b03c5_0_217:notes"/>
           <p:cNvSpPr/>
           <p:nvPr>
             <p:ph idx="2" type="sldImg"/>
@@ -1380,7 +1380,7 @@
       </p:sp>
       <p:sp>
         <p:nvSpPr>
-          <p:cNvPr id="192" name="Google Shape;192;g369690b03c5_0_217:notes"/>
+          <p:cNvPr id="193" name="Google Shape;193;g369690b03c5_0_217:notes"/>
           <p:cNvSpPr txBox="1"/>
           <p:nvPr>
             <p:ph idx="1" type="body"/>
@@ -1430,7 +1430,7 @@
   <p:cSld>
     <p:spTree>
       <p:nvGrpSpPr>
-        <p:cNvPr id="197" name="Shape 197"/>
+        <p:cNvPr id="198" name="Shape 198"/>
         <p:cNvGrpSpPr/>
         <p:nvPr/>
       </p:nvGrpSpPr>
@@ -1444,7 +1444,7 @@
       </p:grpSpPr>
       <p:sp>
         <p:nvSpPr>
-          <p:cNvPr id="198" name="Google Shape;198;g369690b03c5_0_224:notes"/>
+          <p:cNvPr id="199" name="Google Shape;199;g369690b03c5_0_224:notes"/>
           <p:cNvSpPr/>
           <p:nvPr>
             <p:ph idx="2" type="sldImg"/>
@@ -1479,7 +1479,7 @@
       </p:sp>
       <p:sp>
         <p:nvSpPr>
-          <p:cNvPr id="199" name="Google Shape;199;g369690b03c5_0_224:notes"/>
+          <p:cNvPr id="200" name="Google Shape;200;g369690b03c5_0_224:notes"/>
           <p:cNvSpPr txBox="1"/>
           <p:nvPr>
             <p:ph idx="1" type="body"/>
@@ -1529,7 +1529,7 @@
   <p:cSld>
     <p:spTree>
       <p:nvGrpSpPr>
-        <p:cNvPr id="204" name="Shape 204"/>
+        <p:cNvPr id="205" name="Shape 205"/>
         <p:cNvGrpSpPr/>
         <p:nvPr/>
       </p:nvGrpSpPr>
@@ -1543,7 +1543,7 @@
       </p:grpSpPr>
       <p:sp>
         <p:nvSpPr>
-          <p:cNvPr id="205" name="Google Shape;205;g369690b03c5_0_235:notes"/>
+          <p:cNvPr id="206" name="Google Shape;206;g369690b03c5_0_235:notes"/>
           <p:cNvSpPr/>
           <p:nvPr>
             <p:ph idx="2" type="sldImg"/>
@@ -1578,7 +1578,7 @@
       </p:sp>
       <p:sp>
         <p:nvSpPr>
-          <p:cNvPr id="206" name="Google Shape;206;g369690b03c5_0_235:notes"/>
+          <p:cNvPr id="207" name="Google Shape;207;g369690b03c5_0_235:notes"/>
           <p:cNvSpPr txBox="1"/>
           <p:nvPr>
             <p:ph idx="1" type="body"/>
@@ -1628,7 +1628,7 @@
   <p:cSld>
     <p:spTree>
       <p:nvGrpSpPr>
-        <p:cNvPr id="211" name="Shape 211"/>
+        <p:cNvPr id="212" name="Shape 212"/>
         <p:cNvGrpSpPr/>
         <p:nvPr/>
       </p:nvGrpSpPr>
@@ -1642,7 +1642,7 @@
       </p:grpSpPr>
       <p:sp>
         <p:nvSpPr>
-          <p:cNvPr id="212" name="Google Shape;212;g369690b03c5_0_264:notes"/>
+          <p:cNvPr id="213" name="Google Shape;213;g369690b03c5_0_264:notes"/>
           <p:cNvSpPr/>
           <p:nvPr>
             <p:ph idx="2" type="sldImg"/>
@@ -1677,7 +1677,7 @@
       </p:sp>
       <p:sp>
         <p:nvSpPr>
-          <p:cNvPr id="213" name="Google Shape;213;g369690b03c5_0_264:notes"/>
+          <p:cNvPr id="214" name="Google Shape;214;g369690b03c5_0_264:notes"/>
           <p:cNvSpPr txBox="1"/>
           <p:nvPr>
             <p:ph idx="1" type="body"/>
@@ -1727,7 +1727,7 @@
   <p:cSld>
     <p:spTree>
       <p:nvGrpSpPr>
-        <p:cNvPr id="218" name="Shape 218"/>
+        <p:cNvPr id="219" name="Shape 219"/>
         <p:cNvGrpSpPr/>
         <p:nvPr/>
       </p:nvGrpSpPr>
@@ -1741,7 +1741,7 @@
       </p:grpSpPr>
       <p:sp>
         <p:nvSpPr>
-          <p:cNvPr id="219" name="Google Shape;219;g369690b03c5_0_286:notes"/>
+          <p:cNvPr id="220" name="Google Shape;220;g369690b03c5_0_286:notes"/>
           <p:cNvSpPr/>
           <p:nvPr>
             <p:ph idx="2" type="sldImg"/>
@@ -1776,7 +1776,7 @@
       </p:sp>
       <p:sp>
         <p:nvSpPr>
-          <p:cNvPr id="220" name="Google Shape;220;g369690b03c5_0_286:notes"/>
+          <p:cNvPr id="221" name="Google Shape;221;g369690b03c5_0_286:notes"/>
           <p:cNvSpPr txBox="1"/>
           <p:nvPr>
             <p:ph idx="1" type="body"/>
@@ -1925,7 +1925,7 @@
   <p:cSld>
     <p:spTree>
       <p:nvGrpSpPr>
-        <p:cNvPr id="225" name="Shape 225"/>
+        <p:cNvPr id="226" name="Shape 226"/>
         <p:cNvGrpSpPr/>
         <p:nvPr/>
       </p:nvGrpSpPr>
@@ -1939,7 +1939,7 @@
       </p:grpSpPr>
       <p:sp>
         <p:nvSpPr>
-          <p:cNvPr id="226" name="Google Shape;226;p5:notes"/>
+          <p:cNvPr id="227" name="Google Shape;227;p5:notes"/>
           <p:cNvSpPr txBox="1"/>
           <p:nvPr>
             <p:ph idx="1" type="body"/>
@@ -1978,7 +1978,7 @@
       </p:sp>
       <p:sp>
         <p:nvSpPr>
-          <p:cNvPr id="227" name="Google Shape;227;p5:notes"/>
+          <p:cNvPr id="228" name="Google Shape;228;p5:notes"/>
           <p:cNvSpPr/>
           <p:nvPr>
             <p:ph idx="2" type="sldImg"/>
@@ -2024,7 +2024,7 @@
   <p:cSld>
     <p:spTree>
       <p:nvGrpSpPr>
-        <p:cNvPr id="237" name="Shape 237"/>
+        <p:cNvPr id="238" name="Shape 238"/>
         <p:cNvGrpSpPr/>
         <p:nvPr/>
       </p:nvGrpSpPr>
@@ -2038,7 +2038,7 @@
       </p:grpSpPr>
       <p:sp>
         <p:nvSpPr>
-          <p:cNvPr id="238" name="Google Shape;238;p6:notes"/>
+          <p:cNvPr id="239" name="Google Shape;239;p6:notes"/>
           <p:cNvSpPr txBox="1"/>
           <p:nvPr>
             <p:ph idx="1" type="body"/>
@@ -2077,7 +2077,7 @@
       </p:sp>
       <p:sp>
         <p:nvSpPr>
-          <p:cNvPr id="239" name="Google Shape;239;p6:notes"/>
+          <p:cNvPr id="240" name="Google Shape;240;p6:notes"/>
           <p:cNvSpPr/>
           <p:nvPr>
             <p:ph idx="2" type="sldImg"/>
@@ -2123,7 +2123,7 @@
   <p:cSld>
     <p:spTree>
       <p:nvGrpSpPr>
-        <p:cNvPr id="248" name="Shape 248"/>
+        <p:cNvPr id="250" name="Shape 250"/>
         <p:cNvGrpSpPr/>
         <p:nvPr/>
       </p:nvGrpSpPr>
@@ -2137,7 +2137,7 @@
       </p:grpSpPr>
       <p:sp>
         <p:nvSpPr>
-          <p:cNvPr id="249" name="Google Shape;249;g36a36cb3e03_0_20:notes"/>
+          <p:cNvPr id="251" name="Google Shape;251;g36a36cb3e03_0_20:notes"/>
           <p:cNvSpPr/>
           <p:nvPr>
             <p:ph idx="2" type="sldImg"/>
@@ -2172,7 +2172,7 @@
       </p:sp>
       <p:sp>
         <p:nvSpPr>
-          <p:cNvPr id="250" name="Google Shape;250;g36a36cb3e03_0_20:notes"/>
+          <p:cNvPr id="252" name="Google Shape;252;g36a36cb3e03_0_20:notes"/>
           <p:cNvSpPr txBox="1"/>
           <p:nvPr>
             <p:ph idx="1" type="body"/>
@@ -2222,7 +2222,7 @@
   <p:cSld>
     <p:spTree>
       <p:nvGrpSpPr>
-        <p:cNvPr id="255" name="Shape 255"/>
+        <p:cNvPr id="257" name="Shape 257"/>
         <p:cNvGrpSpPr/>
         <p:nvPr/>
       </p:nvGrpSpPr>
@@ -2236,7 +2236,7 @@
       </p:grpSpPr>
       <p:sp>
         <p:nvSpPr>
-          <p:cNvPr id="256" name="Google Shape;256;g36a36cb3e03_0_39:notes"/>
+          <p:cNvPr id="258" name="Google Shape;258;g36a36cb3e03_0_39:notes"/>
           <p:cNvSpPr/>
           <p:nvPr>
             <p:ph idx="2" type="sldImg"/>
@@ -2271,7 +2271,7 @@
       </p:sp>
       <p:sp>
         <p:nvSpPr>
-          <p:cNvPr id="257" name="Google Shape;257;g36a36cb3e03_0_39:notes"/>
+          <p:cNvPr id="259" name="Google Shape;259;g36a36cb3e03_0_39:notes"/>
           <p:cNvSpPr txBox="1"/>
           <p:nvPr>
             <p:ph idx="1" type="body"/>
@@ -2321,7 +2321,7 @@
   <p:cSld>
     <p:spTree>
       <p:nvGrpSpPr>
-        <p:cNvPr id="262" name="Shape 262"/>
+        <p:cNvPr id="264" name="Shape 264"/>
         <p:cNvGrpSpPr/>
         <p:nvPr/>
       </p:nvGrpSpPr>
@@ -2335,7 +2335,7 @@
       </p:grpSpPr>
       <p:sp>
         <p:nvSpPr>
-          <p:cNvPr id="263" name="Google Shape;263;g36a36cb3e03_0_49:notes"/>
+          <p:cNvPr id="265" name="Google Shape;265;g36a36cb3e03_0_49:notes"/>
           <p:cNvSpPr/>
           <p:nvPr>
             <p:ph idx="2" type="sldImg"/>
@@ -2370,7 +2370,7 @@
       </p:sp>
       <p:sp>
         <p:nvSpPr>
-          <p:cNvPr id="264" name="Google Shape;264;g36a36cb3e03_0_49:notes"/>
+          <p:cNvPr id="266" name="Google Shape;266;g36a36cb3e03_0_49:notes"/>
           <p:cNvSpPr txBox="1"/>
           <p:nvPr>
             <p:ph idx="1" type="body"/>
@@ -2420,7 +2420,7 @@
   <p:cSld>
     <p:spTree>
       <p:nvGrpSpPr>
-        <p:cNvPr id="269" name="Shape 269"/>
+        <p:cNvPr id="271" name="Shape 271"/>
         <p:cNvGrpSpPr/>
         <p:nvPr/>
       </p:nvGrpSpPr>
@@ -2434,7 +2434,7 @@
       </p:grpSpPr>
       <p:sp>
         <p:nvSpPr>
-          <p:cNvPr id="270" name="Google Shape;270;g36a36cb3e03_0_57:notes"/>
+          <p:cNvPr id="272" name="Google Shape;272;g36a36cb3e03_0_57:notes"/>
           <p:cNvSpPr/>
           <p:nvPr>
             <p:ph idx="2" type="sldImg"/>
@@ -2469,7 +2469,7 @@
       </p:sp>
       <p:sp>
         <p:nvSpPr>
-          <p:cNvPr id="271" name="Google Shape;271;g36a36cb3e03_0_57:notes"/>
+          <p:cNvPr id="273" name="Google Shape;273;g36a36cb3e03_0_57:notes"/>
           <p:cNvSpPr txBox="1"/>
           <p:nvPr>
             <p:ph idx="1" type="body"/>
@@ -2519,7 +2519,7 @@
   <p:cSld>
     <p:spTree>
       <p:nvGrpSpPr>
-        <p:cNvPr id="276" name="Shape 276"/>
+        <p:cNvPr id="278" name="Shape 278"/>
         <p:cNvGrpSpPr/>
         <p:nvPr/>
       </p:nvGrpSpPr>
@@ -2533,7 +2533,7 @@
       </p:grpSpPr>
       <p:sp>
         <p:nvSpPr>
-          <p:cNvPr id="277" name="Google Shape;277;g36a36cb3e03_0_64:notes"/>
+          <p:cNvPr id="279" name="Google Shape;279;g36a36cb3e03_0_64:notes"/>
           <p:cNvSpPr/>
           <p:nvPr>
             <p:ph idx="2" type="sldImg"/>
@@ -2568,7 +2568,7 @@
       </p:sp>
       <p:sp>
         <p:nvSpPr>
-          <p:cNvPr id="278" name="Google Shape;278;g36a36cb3e03_0_64:notes"/>
+          <p:cNvPr id="280" name="Google Shape;280;g36a36cb3e03_0_64:notes"/>
           <p:cNvSpPr txBox="1"/>
           <p:nvPr>
             <p:ph idx="1" type="body"/>
@@ -2618,7 +2618,7 @@
   <p:cSld>
     <p:spTree>
       <p:nvGrpSpPr>
-        <p:cNvPr id="283" name="Shape 283"/>
+        <p:cNvPr id="285" name="Shape 285"/>
         <p:cNvGrpSpPr/>
         <p:nvPr/>
       </p:nvGrpSpPr>
@@ -2632,7 +2632,7 @@
       </p:grpSpPr>
       <p:sp>
         <p:nvSpPr>
-          <p:cNvPr id="284" name="Google Shape;284;g36a36cb3e03_0_73:notes"/>
+          <p:cNvPr id="286" name="Google Shape;286;g36a36cb3e03_0_73:notes"/>
           <p:cNvSpPr/>
           <p:nvPr>
             <p:ph idx="2" type="sldImg"/>
@@ -2667,7 +2667,7 @@
       </p:sp>
       <p:sp>
         <p:nvSpPr>
-          <p:cNvPr id="285" name="Google Shape;285;g36a36cb3e03_0_73:notes"/>
+          <p:cNvPr id="287" name="Google Shape;287;g36a36cb3e03_0_73:notes"/>
           <p:cNvSpPr txBox="1"/>
           <p:nvPr>
             <p:ph idx="1" type="body"/>
@@ -2717,7 +2717,7 @@
   <p:cSld>
     <p:spTree>
       <p:nvGrpSpPr>
-        <p:cNvPr id="290" name="Shape 290"/>
+        <p:cNvPr id="292" name="Shape 292"/>
         <p:cNvGrpSpPr/>
         <p:nvPr/>
       </p:nvGrpSpPr>
@@ -2731,7 +2731,7 @@
       </p:grpSpPr>
       <p:sp>
         <p:nvSpPr>
-          <p:cNvPr id="291" name="Google Shape;291;g36a36cb3e03_0_80:notes"/>
+          <p:cNvPr id="293" name="Google Shape;293;g36a36cb3e03_0_80:notes"/>
           <p:cNvSpPr/>
           <p:nvPr>
             <p:ph idx="2" type="sldImg"/>
@@ -2766,7 +2766,7 @@
       </p:sp>
       <p:sp>
         <p:nvSpPr>
-          <p:cNvPr id="292" name="Google Shape;292;g36a36cb3e03_0_80:notes"/>
+          <p:cNvPr id="294" name="Google Shape;294;g36a36cb3e03_0_80:notes"/>
           <p:cNvSpPr txBox="1"/>
           <p:nvPr>
             <p:ph idx="1" type="body"/>
@@ -2816,7 +2816,7 @@
   <p:cSld>
     <p:spTree>
       <p:nvGrpSpPr>
-        <p:cNvPr id="298" name="Shape 298"/>
+        <p:cNvPr id="300" name="Shape 300"/>
         <p:cNvGrpSpPr/>
         <p:nvPr/>
       </p:nvGrpSpPr>
@@ -2830,7 +2830,7 @@
       </p:grpSpPr>
       <p:sp>
         <p:nvSpPr>
-          <p:cNvPr id="299" name="Google Shape;299;g36a36cb3e03_0_90:notes"/>
+          <p:cNvPr id="301" name="Google Shape;301;g36a36cb3e03_0_90:notes"/>
           <p:cNvSpPr/>
           <p:nvPr>
             <p:ph idx="2" type="sldImg"/>
@@ -2865,7 +2865,7 @@
       </p:sp>
       <p:sp>
         <p:nvSpPr>
-          <p:cNvPr id="300" name="Google Shape;300;g36a36cb3e03_0_90:notes"/>
+          <p:cNvPr id="302" name="Google Shape;302;g36a36cb3e03_0_90:notes"/>
           <p:cNvSpPr txBox="1"/>
           <p:nvPr>
             <p:ph idx="1" type="body"/>
@@ -3014,7 +3014,7 @@
   <p:cSld>
     <p:spTree>
       <p:nvGrpSpPr>
-        <p:cNvPr id="309" name="Shape 309"/>
+        <p:cNvPr id="311" name="Shape 311"/>
         <p:cNvGrpSpPr/>
         <p:nvPr/>
       </p:nvGrpSpPr>
@@ -3028,7 +3028,7 @@
       </p:grpSpPr>
       <p:sp>
         <p:nvSpPr>
-          <p:cNvPr id="310" name="Google Shape;310;p9:notes"/>
+          <p:cNvPr id="312" name="Google Shape;312;p9:notes"/>
           <p:cNvSpPr txBox="1"/>
           <p:nvPr>
             <p:ph idx="1" type="body"/>
@@ -3067,7 +3067,7 @@
       </p:sp>
       <p:sp>
         <p:nvSpPr>
-          <p:cNvPr id="311" name="Google Shape;311;p9:notes"/>
+          <p:cNvPr id="313" name="Google Shape;313;p9:notes"/>
           <p:cNvSpPr/>
           <p:nvPr>
             <p:ph idx="2" type="sldImg"/>
@@ -3113,7 +3113,7 @@
   <p:cSld>
     <p:spTree>
       <p:nvGrpSpPr>
-        <p:cNvPr id="317" name="Shape 317"/>
+        <p:cNvPr id="319" name="Shape 319"/>
         <p:cNvGrpSpPr/>
         <p:nvPr/>
       </p:nvGrpSpPr>
@@ -3127,7 +3127,7 @@
       </p:grpSpPr>
       <p:sp>
         <p:nvSpPr>
-          <p:cNvPr id="318" name="Google Shape;318;p10:notes"/>
+          <p:cNvPr id="320" name="Google Shape;320;p10:notes"/>
           <p:cNvSpPr txBox="1"/>
           <p:nvPr>
             <p:ph idx="1" type="body"/>
@@ -3166,7 +3166,7 @@
       </p:sp>
       <p:sp>
         <p:nvSpPr>
-          <p:cNvPr id="319" name="Google Shape;319;p10:notes"/>
+          <p:cNvPr id="321" name="Google Shape;321;p10:notes"/>
           <p:cNvSpPr/>
           <p:nvPr>
             <p:ph idx="2" type="sldImg"/>
@@ -3212,7 +3212,7 @@
   <p:cSld>
     <p:spTree>
       <p:nvGrpSpPr>
-        <p:cNvPr id="324" name="Shape 324"/>
+        <p:cNvPr id="326" name="Shape 326"/>
         <p:cNvGrpSpPr/>
         <p:nvPr/>
       </p:nvGrpSpPr>
@@ -3226,7 +3226,7 @@
       </p:grpSpPr>
       <p:sp>
         <p:nvSpPr>
-          <p:cNvPr id="325" name="Google Shape;325;p11:notes"/>
+          <p:cNvPr id="327" name="Google Shape;327;p11:notes"/>
           <p:cNvSpPr txBox="1"/>
           <p:nvPr>
             <p:ph idx="1" type="body"/>
@@ -3265,7 +3265,7 @@
       </p:sp>
       <p:sp>
         <p:nvSpPr>
-          <p:cNvPr id="326" name="Google Shape;326;p11:notes"/>
+          <p:cNvPr id="328" name="Google Shape;328;p11:notes"/>
           <p:cNvSpPr/>
           <p:nvPr>
             <p:ph idx="2" type="sldImg"/>
@@ -3311,7 +3311,7 @@
   <p:cSld>
     <p:spTree>
       <p:nvGrpSpPr>
-        <p:cNvPr id="331" name="Shape 331"/>
+        <p:cNvPr id="333" name="Shape 333"/>
         <p:cNvGrpSpPr/>
         <p:nvPr/>
       </p:nvGrpSpPr>
@@ -3325,7 +3325,7 @@
       </p:grpSpPr>
       <p:sp>
         <p:nvSpPr>
-          <p:cNvPr id="332" name="Google Shape;332;g36a36cb3e03_0_115:notes"/>
+          <p:cNvPr id="334" name="Google Shape;334;g36a36cb3e03_0_115:notes"/>
           <p:cNvSpPr/>
           <p:nvPr>
             <p:ph idx="2" type="sldImg"/>
@@ -3360,7 +3360,7 @@
       </p:sp>
       <p:sp>
         <p:nvSpPr>
-          <p:cNvPr id="333" name="Google Shape;333;g36a36cb3e03_0_115:notes"/>
+          <p:cNvPr id="335" name="Google Shape;335;g36a36cb3e03_0_115:notes"/>
           <p:cNvSpPr txBox="1"/>
           <p:nvPr>
             <p:ph idx="1" type="body"/>
@@ -3410,7 +3410,7 @@
   <p:cSld>
     <p:spTree>
       <p:nvGrpSpPr>
-        <p:cNvPr id="338" name="Shape 338"/>
+        <p:cNvPr id="340" name="Shape 340"/>
         <p:cNvGrpSpPr/>
         <p:nvPr/>
       </p:nvGrpSpPr>
@@ -3424,7 +3424,7 @@
       </p:grpSpPr>
       <p:sp>
         <p:nvSpPr>
-          <p:cNvPr id="339" name="Google Shape;339;p13:notes"/>
+          <p:cNvPr id="341" name="Google Shape;341;p13:notes"/>
           <p:cNvSpPr txBox="1"/>
           <p:nvPr>
             <p:ph idx="1" type="body"/>
@@ -3463,7 +3463,7 @@
       </p:sp>
       <p:sp>
         <p:nvSpPr>
-          <p:cNvPr id="340" name="Google Shape;340;p13:notes"/>
+          <p:cNvPr id="342" name="Google Shape;342;p13:notes"/>
           <p:cNvSpPr/>
           <p:nvPr>
             <p:ph idx="2" type="sldImg"/>
@@ -3509,7 +3509,7 @@
   <p:cSld>
     <p:spTree>
       <p:nvGrpSpPr>
-        <p:cNvPr id="345" name="Shape 345"/>
+        <p:cNvPr id="347" name="Shape 347"/>
         <p:cNvGrpSpPr/>
         <p:nvPr/>
       </p:nvGrpSpPr>
@@ -3523,7 +3523,7 @@
       </p:grpSpPr>
       <p:sp>
         <p:nvSpPr>
-          <p:cNvPr id="346" name="Google Shape;346;p14:notes"/>
+          <p:cNvPr id="348" name="Google Shape;348;p14:notes"/>
           <p:cNvSpPr txBox="1"/>
           <p:nvPr>
             <p:ph idx="1" type="body"/>
@@ -3562,7 +3562,7 @@
       </p:sp>
       <p:sp>
         <p:nvSpPr>
-          <p:cNvPr id="347" name="Google Shape;347;p14:notes"/>
+          <p:cNvPr id="349" name="Google Shape;349;p14:notes"/>
           <p:cNvSpPr/>
           <p:nvPr>
             <p:ph idx="2" type="sldImg"/>
@@ -14449,7 +14449,7 @@
             <a:tbl>
               <a:tblPr>
                 <a:noFill/>
-                <a:tableStyleId>{612DB85B-09D3-4AB4-80B9-41EA9D3D7577}</a:tableStyleId>
+                <a:tableStyleId>{1A739EA9-C52D-4B98-B90B-9A33190725C9}</a:tableStyleId>
               </a:tblPr>
               <a:tblGrid>
                 <a:gridCol w="2413000"/>
@@ -16777,6 +16777,64 @@
           </a:p>
         </p:txBody>
       </p:sp>
+      <p:sp>
+        <p:nvSpPr>
+          <p:cNvPr id="179" name="Google Shape;179;g369690b03c5_0_189"/>
+          <p:cNvSpPr txBox="1"/>
+          <p:nvPr/>
+        </p:nvSpPr>
+        <p:spPr>
+          <a:xfrm>
+            <a:off x="270175" y="5704600"/>
+            <a:ext cx="5182500" cy="651900"/>
+          </a:xfrm>
+          <a:prstGeom prst="rect">
+            <a:avLst/>
+          </a:prstGeom>
+          <a:noFill/>
+          <a:ln>
+            <a:noFill/>
+          </a:ln>
+        </p:spPr>
+        <p:txBody>
+          <a:bodyPr anchorCtr="0" anchor="t" bIns="91425" lIns="91425" spcFirstLastPara="1" rIns="91425" wrap="square" tIns="91425">
+            <a:noAutofit/>
+          </a:bodyPr>
+          <a:lstStyle/>
+          <a:p>
+            <a:pPr indent="0" lvl="0" marL="0" rtl="0" algn="l">
+              <a:spcBef>
+                <a:spcPts val="0"/>
+              </a:spcBef>
+              <a:spcAft>
+                <a:spcPts val="0"/>
+              </a:spcAft>
+              <a:buNone/>
+            </a:pPr>
+            <a:r>
+              <a:rPr lang="en-US" sz="1800">
+                <a:solidFill>
+                  <a:schemeClr val="dk1"/>
+                </a:solidFill>
+                <a:latin typeface="Calibri"/>
+                <a:ea typeface="Calibri"/>
+                <a:cs typeface="Calibri"/>
+                <a:sym typeface="Calibri"/>
+              </a:rPr>
+              <a:t>Mainly PostGres Supports this, not all. </a:t>
+            </a:r>
+            <a:endParaRPr sz="1800">
+              <a:solidFill>
+                <a:schemeClr val="dk1"/>
+              </a:solidFill>
+              <a:latin typeface="Calibri"/>
+              <a:ea typeface="Calibri"/>
+              <a:cs typeface="Calibri"/>
+              <a:sym typeface="Calibri"/>
+            </a:endParaRPr>
+          </a:p>
+        </p:txBody>
+      </p:sp>
     </p:spTree>
   </p:cSld>
   <p:clrMapOvr>
@@ -16790,7 +16848,7 @@
   <p:cSld>
     <p:spTree>
       <p:nvGrpSpPr>
-        <p:cNvPr id="182" name="Shape 182"/>
+        <p:cNvPr id="183" name="Shape 183"/>
         <p:cNvGrpSpPr/>
         <p:nvPr/>
       </p:nvGrpSpPr>
@@ -16804,7 +16862,7 @@
       </p:grpSpPr>
       <p:sp>
         <p:nvSpPr>
-          <p:cNvPr id="183" name="Google Shape;183;g369690b03c5_0_206"/>
+          <p:cNvPr id="184" name="Google Shape;184;g369690b03c5_0_206"/>
           <p:cNvSpPr txBox="1"/>
           <p:nvPr>
             <p:ph type="title"/>
@@ -16844,7 +16902,7 @@
       </p:sp>
       <p:sp>
         <p:nvSpPr>
-          <p:cNvPr id="184" name="Google Shape;184;g369690b03c5_0_206"/>
+          <p:cNvPr id="185" name="Google Shape;185;g369690b03c5_0_206"/>
           <p:cNvSpPr txBox="1"/>
           <p:nvPr>
             <p:ph idx="1" type="body"/>
@@ -17236,7 +17294,7 @@
                 <a:cs typeface="Courier New"/>
                 <a:sym typeface="Courier New"/>
               </a:rPr>
-              <a:t>SELECT s.name, c.title</a:t>
+              <a:t>SELECT DEREF(s).name, c.title</a:t>
             </a:r>
             <a:endParaRPr sz="1600">
               <a:solidFill>
@@ -17349,7 +17407,7 @@
       </p:sp>
       <p:sp>
         <p:nvSpPr>
-          <p:cNvPr id="185" name="Google Shape;185;g369690b03c5_0_206"/>
+          <p:cNvPr id="186" name="Google Shape;186;g369690b03c5_0_206"/>
           <p:cNvSpPr txBox="1"/>
           <p:nvPr>
             <p:ph idx="12" type="sldNum"/>
@@ -17393,7 +17451,7 @@
       </p:sp>
       <p:sp>
         <p:nvSpPr>
-          <p:cNvPr id="186" name="Google Shape;186;g369690b03c5_0_206"/>
+          <p:cNvPr id="187" name="Google Shape;187;g369690b03c5_0_206"/>
           <p:cNvSpPr txBox="1"/>
           <p:nvPr/>
         </p:nvSpPr>
@@ -17435,9 +17493,9 @@
       </p:sp>
       <p:cxnSp>
         <p:nvCxnSpPr>
-          <p:cNvPr id="187" name="Google Shape;187;g369690b03c5_0_206"/>
+          <p:cNvPr id="188" name="Google Shape;188;g369690b03c5_0_206"/>
           <p:cNvCxnSpPr>
-            <a:stCxn id="186" idx="1"/>
+            <a:stCxn id="187" idx="1"/>
           </p:cNvCxnSpPr>
           <p:nvPr/>
         </p:nvCxnSpPr>
@@ -17463,7 +17521,7 @@
       </p:cxnSp>
       <p:sp>
         <p:nvSpPr>
-          <p:cNvPr id="188" name="Google Shape;188;g369690b03c5_0_206"/>
+          <p:cNvPr id="189" name="Google Shape;189;g369690b03c5_0_206"/>
           <p:cNvSpPr txBox="1"/>
           <p:nvPr/>
         </p:nvSpPr>
@@ -17505,9 +17563,9 @@
       </p:sp>
       <p:cxnSp>
         <p:nvCxnSpPr>
-          <p:cNvPr id="189" name="Google Shape;189;g369690b03c5_0_206"/>
+          <p:cNvPr id="190" name="Google Shape;190;g369690b03c5_0_206"/>
           <p:cNvCxnSpPr>
-            <a:stCxn id="188" idx="0"/>
+            <a:stCxn id="189" idx="0"/>
           </p:cNvCxnSpPr>
           <p:nvPr/>
         </p:nvCxnSpPr>
@@ -17544,7 +17602,7 @@
   <p:cSld>
     <p:spTree>
       <p:nvGrpSpPr>
-        <p:cNvPr id="193" name="Shape 193"/>
+        <p:cNvPr id="194" name="Shape 194"/>
         <p:cNvGrpSpPr/>
         <p:nvPr/>
       </p:nvGrpSpPr>
@@ -17558,7 +17616,7 @@
       </p:grpSpPr>
       <p:sp>
         <p:nvSpPr>
-          <p:cNvPr id="194" name="Google Shape;194;g369690b03c5_0_217"/>
+          <p:cNvPr id="195" name="Google Shape;195;g369690b03c5_0_217"/>
           <p:cNvSpPr txBox="1"/>
           <p:nvPr>
             <p:ph type="title"/>
@@ -17598,7 +17656,7 @@
       </p:sp>
       <p:sp>
         <p:nvSpPr>
-          <p:cNvPr id="195" name="Google Shape;195;g369690b03c5_0_217"/>
+          <p:cNvPr id="196" name="Google Shape;196;g369690b03c5_0_217"/>
           <p:cNvSpPr txBox="1"/>
           <p:nvPr>
             <p:ph idx="1" type="body"/>
@@ -18263,7 +18321,7 @@
       </p:sp>
       <p:sp>
         <p:nvSpPr>
-          <p:cNvPr id="196" name="Google Shape;196;g369690b03c5_0_217"/>
+          <p:cNvPr id="197" name="Google Shape;197;g369690b03c5_0_217"/>
           <p:cNvSpPr txBox="1"/>
           <p:nvPr>
             <p:ph idx="12" type="sldNum"/>
@@ -18318,7 +18376,7 @@
   <p:cSld>
     <p:spTree>
       <p:nvGrpSpPr>
-        <p:cNvPr id="200" name="Shape 200"/>
+        <p:cNvPr id="201" name="Shape 201"/>
         <p:cNvGrpSpPr/>
         <p:nvPr/>
       </p:nvGrpSpPr>
@@ -18332,7 +18390,7 @@
       </p:grpSpPr>
       <p:sp>
         <p:nvSpPr>
-          <p:cNvPr id="201" name="Google Shape;201;g369690b03c5_0_224"/>
+          <p:cNvPr id="202" name="Google Shape;202;g369690b03c5_0_224"/>
           <p:cNvSpPr txBox="1"/>
           <p:nvPr>
             <p:ph type="title"/>
@@ -18372,7 +18430,7 @@
       </p:sp>
       <p:sp>
         <p:nvSpPr>
-          <p:cNvPr id="202" name="Google Shape;202;g369690b03c5_0_224"/>
+          <p:cNvPr id="203" name="Google Shape;203;g369690b03c5_0_224"/>
           <p:cNvSpPr txBox="1"/>
           <p:nvPr>
             <p:ph idx="12" type="sldNum"/>
@@ -18416,7 +18474,7 @@
       </p:sp>
       <p:graphicFrame>
         <p:nvGraphicFramePr>
-          <p:cNvPr id="203" name="Google Shape;203;g369690b03c5_0_224"/>
+          <p:cNvPr id="204" name="Google Shape;204;g369690b03c5_0_224"/>
           <p:cNvGraphicFramePr/>
           <p:nvPr/>
         </p:nvGraphicFramePr>
@@ -18429,7 +18487,7 @@
             <a:tbl>
               <a:tblPr>
                 <a:noFill/>
-                <a:tableStyleId>{612DB85B-09D3-4AB4-80B9-41EA9D3D7577}</a:tableStyleId>
+                <a:tableStyleId>{1A739EA9-C52D-4B98-B90B-9A33190725C9}</a:tableStyleId>
               </a:tblPr>
               <a:tblGrid>
                 <a:gridCol w="2413000"/>
@@ -20017,7 +20075,7 @@
   <p:cSld>
     <p:spTree>
       <p:nvGrpSpPr>
-        <p:cNvPr id="207" name="Shape 207"/>
+        <p:cNvPr id="208" name="Shape 208"/>
         <p:cNvGrpSpPr/>
         <p:nvPr/>
       </p:nvGrpSpPr>
@@ -20031,7 +20089,7 @@
       </p:grpSpPr>
       <p:sp>
         <p:nvSpPr>
-          <p:cNvPr id="208" name="Google Shape;208;g369690b03c5_0_235"/>
+          <p:cNvPr id="209" name="Google Shape;209;g369690b03c5_0_235"/>
           <p:cNvSpPr txBox="1"/>
           <p:nvPr>
             <p:ph type="title"/>
@@ -20071,7 +20129,7 @@
       </p:sp>
       <p:sp>
         <p:nvSpPr>
-          <p:cNvPr id="209" name="Google Shape;209;g369690b03c5_0_235"/>
+          <p:cNvPr id="210" name="Google Shape;210;g369690b03c5_0_235"/>
           <p:cNvSpPr txBox="1"/>
           <p:nvPr>
             <p:ph idx="12" type="sldNum"/>
@@ -20115,7 +20173,7 @@
       </p:sp>
       <p:graphicFrame>
         <p:nvGraphicFramePr>
-          <p:cNvPr id="210" name="Google Shape;210;g369690b03c5_0_235"/>
+          <p:cNvPr id="211" name="Google Shape;211;g369690b03c5_0_235"/>
           <p:cNvGraphicFramePr/>
           <p:nvPr/>
         </p:nvGraphicFramePr>
@@ -20128,7 +20186,7 @@
             <a:tbl>
               <a:tblPr>
                 <a:noFill/>
-                <a:tableStyleId>{612DB85B-09D3-4AB4-80B9-41EA9D3D7577}</a:tableStyleId>
+                <a:tableStyleId>{1A739EA9-C52D-4B98-B90B-9A33190725C9}</a:tableStyleId>
               </a:tblPr>
               <a:tblGrid>
                 <a:gridCol w="382850"/>
@@ -20837,7 +20895,7 @@
                           <a:cs typeface="Cambria"/>
                           <a:sym typeface="Cambria"/>
                         </a:rPr>
-                        <a:t>SELECT c.instructor.department</a:t>
+                        <a:t>SELECT DEREF(c.instructor).department</a:t>
                       </a:r>
                       <a:endParaRPr sz="1200">
                         <a:solidFill>
@@ -21147,7 +21205,7 @@
   <p:cSld>
     <p:spTree>
       <p:nvGrpSpPr>
-        <p:cNvPr id="214" name="Shape 214"/>
+        <p:cNvPr id="215" name="Shape 215"/>
         <p:cNvGrpSpPr/>
         <p:nvPr/>
       </p:nvGrpSpPr>
@@ -21161,7 +21219,7 @@
       </p:grpSpPr>
       <p:sp>
         <p:nvSpPr>
-          <p:cNvPr id="215" name="Google Shape;215;g369690b03c5_0_264"/>
+          <p:cNvPr id="216" name="Google Shape;216;g369690b03c5_0_264"/>
           <p:cNvSpPr txBox="1"/>
           <p:nvPr>
             <p:ph type="title"/>
@@ -21206,7 +21264,7 @@
       </p:sp>
       <p:sp>
         <p:nvSpPr>
-          <p:cNvPr id="216" name="Google Shape;216;g369690b03c5_0_264"/>
+          <p:cNvPr id="217" name="Google Shape;217;g369690b03c5_0_264"/>
           <p:cNvSpPr txBox="1"/>
           <p:nvPr>
             <p:ph idx="12" type="sldNum"/>
@@ -21250,7 +21308,7 @@
       </p:sp>
       <p:graphicFrame>
         <p:nvGraphicFramePr>
-          <p:cNvPr id="217" name="Google Shape;217;g369690b03c5_0_264"/>
+          <p:cNvPr id="218" name="Google Shape;218;g369690b03c5_0_264"/>
           <p:cNvGraphicFramePr/>
           <p:nvPr/>
         </p:nvGraphicFramePr>
@@ -21263,7 +21321,7 @@
             <a:tbl>
               <a:tblPr>
                 <a:noFill/>
-                <a:tableStyleId>{612DB85B-09D3-4AB4-80B9-41EA9D3D7577}</a:tableStyleId>
+                <a:tableStyleId>{1A739EA9-C52D-4B98-B90B-9A33190725C9}</a:tableStyleId>
               </a:tblPr>
               <a:tblGrid>
                 <a:gridCol w="382850"/>
@@ -21446,7 +21504,7 @@
                           <a:cs typeface="Cambria"/>
                           <a:sym typeface="Cambria"/>
                         </a:rPr>
-                        <a:t>SELECT s.name</a:t>
+                        <a:t>SELECT DEREF(s).name</a:t>
                       </a:r>
                       <a:endParaRPr sz="1200">
                         <a:solidFill>
@@ -22312,7 +22370,7 @@
   <p:cSld>
     <p:spTree>
       <p:nvGrpSpPr>
-        <p:cNvPr id="221" name="Shape 221"/>
+        <p:cNvPr id="222" name="Shape 222"/>
         <p:cNvGrpSpPr/>
         <p:nvPr/>
       </p:nvGrpSpPr>
@@ -22326,7 +22384,7 @@
       </p:grpSpPr>
       <p:sp>
         <p:nvSpPr>
-          <p:cNvPr id="222" name="Google Shape;222;g369690b03c5_0_286"/>
+          <p:cNvPr id="223" name="Google Shape;223;g369690b03c5_0_286"/>
           <p:cNvSpPr txBox="1"/>
           <p:nvPr>
             <p:ph type="title"/>
@@ -22366,7 +22424,7 @@
       </p:sp>
       <p:sp>
         <p:nvSpPr>
-          <p:cNvPr id="223" name="Google Shape;223;g369690b03c5_0_286"/>
+          <p:cNvPr id="224" name="Google Shape;224;g369690b03c5_0_286"/>
           <p:cNvSpPr txBox="1"/>
           <p:nvPr>
             <p:ph idx="12" type="sldNum"/>
@@ -22410,7 +22468,7 @@
       </p:sp>
       <p:graphicFrame>
         <p:nvGraphicFramePr>
-          <p:cNvPr id="224" name="Google Shape;224;g369690b03c5_0_286"/>
+          <p:cNvPr id="225" name="Google Shape;225;g369690b03c5_0_286"/>
           <p:cNvGraphicFramePr/>
           <p:nvPr/>
         </p:nvGraphicFramePr>
@@ -22423,7 +22481,7 @@
             <a:tbl>
               <a:tblPr>
                 <a:noFill/>
-                <a:tableStyleId>{612DB85B-09D3-4AB4-80B9-41EA9D3D7577}</a:tableStyleId>
+                <a:tableStyleId>{1A739EA9-C52D-4B98-B90B-9A33190725C9}</a:tableStyleId>
               </a:tblPr>
               <a:tblGrid>
                 <a:gridCol w="382850"/>
@@ -23208,7 +23266,7 @@
   <p:cSld>
     <p:spTree>
       <p:nvGrpSpPr>
-        <p:cNvPr id="228" name="Shape 228"/>
+        <p:cNvPr id="229" name="Shape 229"/>
         <p:cNvGrpSpPr/>
         <p:nvPr/>
       </p:nvGrpSpPr>
@@ -23222,7 +23280,7 @@
       </p:grpSpPr>
       <p:sp>
         <p:nvSpPr>
-          <p:cNvPr id="229" name="Google Shape;229;p5"/>
+          <p:cNvPr id="230" name="Google Shape;230;p5"/>
           <p:cNvSpPr txBox="1"/>
           <p:nvPr>
             <p:ph type="title"/>
@@ -23284,7 +23342,7 @@
       </p:sp>
       <p:sp>
         <p:nvSpPr>
-          <p:cNvPr id="230" name="Google Shape;230;p5"/>
+          <p:cNvPr id="231" name="Google Shape;231;p5"/>
           <p:cNvSpPr txBox="1"/>
           <p:nvPr>
             <p:ph idx="12" type="sldNum"/>
@@ -23324,7 +23382,7 @@
       </p:sp>
       <p:sp>
         <p:nvSpPr>
-          <p:cNvPr id="231" name="Google Shape;231;p5"/>
+          <p:cNvPr id="232" name="Google Shape;232;p5"/>
           <p:cNvSpPr txBox="1"/>
           <p:nvPr/>
         </p:nvSpPr>
@@ -23636,7 +23694,7 @@
       </p:sp>
       <p:sp>
         <p:nvSpPr>
-          <p:cNvPr id="232" name="Google Shape;232;p5"/>
+          <p:cNvPr id="233" name="Google Shape;233;p5"/>
           <p:cNvSpPr txBox="1"/>
           <p:nvPr/>
         </p:nvSpPr>
@@ -23717,7 +23775,7 @@
       </p:sp>
       <p:sp>
         <p:nvSpPr>
-          <p:cNvPr id="233" name="Google Shape;233;p5"/>
+          <p:cNvPr id="234" name="Google Shape;234;p5"/>
           <p:cNvSpPr txBox="1"/>
           <p:nvPr/>
         </p:nvSpPr>
@@ -23879,7 +23937,7 @@
       </p:sp>
       <p:sp>
         <p:nvSpPr>
-          <p:cNvPr id="234" name="Google Shape;234;p5"/>
+          <p:cNvPr id="235" name="Google Shape;235;p5"/>
           <p:cNvSpPr txBox="1"/>
           <p:nvPr/>
         </p:nvSpPr>
@@ -23981,7 +24039,7 @@
       </p:sp>
       <p:sp>
         <p:nvSpPr>
-          <p:cNvPr id="235" name="Google Shape;235;p5"/>
+          <p:cNvPr id="236" name="Google Shape;236;p5"/>
           <p:cNvSpPr txBox="1"/>
           <p:nvPr/>
         </p:nvSpPr>
@@ -24039,7 +24097,7 @@
       </p:sp>
       <p:sp>
         <p:nvSpPr>
-          <p:cNvPr id="236" name="Google Shape;236;p5"/>
+          <p:cNvPr id="237" name="Google Shape;237;p5"/>
           <p:cNvSpPr txBox="1"/>
           <p:nvPr/>
         </p:nvSpPr>
@@ -24114,7 +24172,7 @@
   <p:cSld>
     <p:spTree>
       <p:nvGrpSpPr>
-        <p:cNvPr id="240" name="Shape 240"/>
+        <p:cNvPr id="241" name="Shape 241"/>
         <p:cNvGrpSpPr/>
         <p:nvPr/>
       </p:nvGrpSpPr>
@@ -24128,7 +24186,7 @@
       </p:grpSpPr>
       <p:sp>
         <p:nvSpPr>
-          <p:cNvPr id="241" name="Google Shape;241;p6"/>
+          <p:cNvPr id="242" name="Google Shape;242;p6"/>
           <p:cNvSpPr txBox="1"/>
           <p:nvPr>
             <p:ph type="title"/>
@@ -24190,7 +24248,7 @@
       </p:sp>
       <p:sp>
         <p:nvSpPr>
-          <p:cNvPr id="242" name="Google Shape;242;p6"/>
+          <p:cNvPr id="243" name="Google Shape;243;p6"/>
           <p:cNvSpPr txBox="1"/>
           <p:nvPr>
             <p:ph idx="1" type="body"/>
@@ -24267,7 +24325,7 @@
       </p:sp>
       <p:sp>
         <p:nvSpPr>
-          <p:cNvPr id="243" name="Google Shape;243;p6"/>
+          <p:cNvPr id="244" name="Google Shape;244;p6"/>
           <p:cNvSpPr txBox="1"/>
           <p:nvPr>
             <p:ph idx="12" type="sldNum"/>
@@ -24307,7 +24365,7 @@
       </p:sp>
       <p:sp>
         <p:nvSpPr>
-          <p:cNvPr id="244" name="Google Shape;244;p6"/>
+          <p:cNvPr id="245" name="Google Shape;245;p6"/>
           <p:cNvSpPr txBox="1"/>
           <p:nvPr/>
         </p:nvSpPr>
@@ -24697,14 +24755,14 @@
       </p:sp>
       <p:sp>
         <p:nvSpPr>
-          <p:cNvPr id="245" name="Google Shape;245;p6"/>
+          <p:cNvPr id="246" name="Google Shape;246;p6"/>
           <p:cNvSpPr txBox="1"/>
           <p:nvPr/>
         </p:nvSpPr>
         <p:spPr>
           <a:xfrm>
-            <a:off x="690125" y="3746088"/>
-            <a:ext cx="8076300" cy="400200"/>
+            <a:off x="600075" y="4202125"/>
+            <a:ext cx="8076300" cy="615600"/>
           </a:xfrm>
           <a:prstGeom prst="rect">
             <a:avLst/>
@@ -24730,6 +24788,38 @@
               <a:buNone/>
             </a:pPr>
             <a:r>
+              <a:rPr b="1" lang="en-US">
+                <a:solidFill>
+                  <a:schemeClr val="dk1"/>
+                </a:solidFill>
+                <a:latin typeface="Courier New"/>
+                <a:ea typeface="Courier New"/>
+                <a:cs typeface="Courier New"/>
+                <a:sym typeface="Courier New"/>
+              </a:rPr>
+              <a:t>Read Query</a:t>
+            </a:r>
+            <a:endParaRPr b="1">
+              <a:solidFill>
+                <a:schemeClr val="dk1"/>
+              </a:solidFill>
+              <a:latin typeface="Courier New"/>
+              <a:ea typeface="Courier New"/>
+              <a:cs typeface="Courier New"/>
+              <a:sym typeface="Courier New"/>
+            </a:endParaRPr>
+          </a:p>
+          <a:p>
+            <a:pPr indent="0" lvl="0" marL="0" rtl="0" algn="l">
+              <a:spcBef>
+                <a:spcPts val="0"/>
+              </a:spcBef>
+              <a:spcAft>
+                <a:spcPts val="0"/>
+              </a:spcAft>
+              <a:buNone/>
+            </a:pPr>
+            <a:r>
               <a:rPr lang="en-US">
                 <a:solidFill>
                   <a:srgbClr val="9900FF"/>
@@ -24755,7 +24845,7 @@
       </p:sp>
       <p:sp>
         <p:nvSpPr>
-          <p:cNvPr id="246" name="Google Shape;246;p6"/>
+          <p:cNvPr id="247" name="Google Shape;247;p6"/>
           <p:cNvSpPr txBox="1"/>
           <p:nvPr/>
         </p:nvSpPr>
@@ -24813,9 +24903,9 @@
       </p:sp>
       <p:cxnSp>
         <p:nvCxnSpPr>
-          <p:cNvPr id="247" name="Google Shape;247;p6"/>
+          <p:cNvPr id="248" name="Google Shape;248;p6"/>
           <p:cNvCxnSpPr>
-            <a:stCxn id="246" idx="1"/>
+            <a:stCxn id="247" idx="1"/>
           </p:cNvCxnSpPr>
           <p:nvPr/>
         </p:nvCxnSpPr>
@@ -24839,6 +24929,87 @@
           </a:ln>
         </p:spPr>
       </p:cxnSp>
+      <p:sp>
+        <p:nvSpPr>
+          <p:cNvPr id="249" name="Google Shape;249;p6"/>
+          <p:cNvSpPr txBox="1"/>
+          <p:nvPr/>
+        </p:nvSpPr>
+        <p:spPr>
+          <a:xfrm>
+            <a:off x="600075" y="3369413"/>
+            <a:ext cx="7529400" cy="615600"/>
+          </a:xfrm>
+          <a:prstGeom prst="rect">
+            <a:avLst/>
+          </a:prstGeom>
+          <a:noFill/>
+          <a:ln>
+            <a:noFill/>
+          </a:ln>
+        </p:spPr>
+        <p:txBody>
+          <a:bodyPr anchorCtr="0" anchor="t" bIns="91425" lIns="91425" spcFirstLastPara="1" rIns="91425" wrap="square" tIns="91425">
+            <a:spAutoFit/>
+          </a:bodyPr>
+          <a:lstStyle/>
+          <a:p>
+            <a:pPr indent="0" lvl="0" marL="0" rtl="0" algn="l">
+              <a:spcBef>
+                <a:spcPts val="0"/>
+              </a:spcBef>
+              <a:spcAft>
+                <a:spcPts val="0"/>
+              </a:spcAft>
+              <a:buNone/>
+            </a:pPr>
+            <a:r>
+              <a:rPr b="1" lang="en-US">
+                <a:solidFill>
+                  <a:schemeClr val="dk1"/>
+                </a:solidFill>
+                <a:latin typeface="Courier New"/>
+                <a:ea typeface="Courier New"/>
+                <a:cs typeface="Courier New"/>
+                <a:sym typeface="Courier New"/>
+              </a:rPr>
+              <a:t>Insertion Query</a:t>
+            </a:r>
+            <a:br>
+              <a:rPr lang="en-US">
+                <a:solidFill>
+                  <a:srgbClr val="188038"/>
+                </a:solidFill>
+                <a:latin typeface="Courier New"/>
+                <a:ea typeface="Courier New"/>
+                <a:cs typeface="Courier New"/>
+                <a:sym typeface="Courier New"/>
+              </a:rPr>
+            </a:br>
+            <a:r>
+              <a:rPr lang="en-US">
+                <a:solidFill>
+                  <a:srgbClr val="188038"/>
+                </a:solidFill>
+                <a:latin typeface="Courier New"/>
+                <a:ea typeface="Courier New"/>
+                <a:cs typeface="Courier New"/>
+                <a:sym typeface="Courier New"/>
+              </a:rPr>
+              <a:t>INSERT INTO People VALUES (Student('Alice', 'Computer Science'));</a:t>
+            </a:r>
+            <a:endParaRPr>
+              <a:solidFill>
+                <a:srgbClr val="188038"/>
+              </a:solidFill>
+              <a:latin typeface="Courier New"/>
+              <a:ea typeface="Courier New"/>
+              <a:cs typeface="Courier New"/>
+              <a:sym typeface="Courier New"/>
+            </a:endParaRPr>
+          </a:p>
+        </p:txBody>
+      </p:sp>
     </p:spTree>
   </p:cSld>
   <p:clrMapOvr>
@@ -24852,7 +25023,7 @@
   <p:cSld>
     <p:spTree>
       <p:nvGrpSpPr>
-        <p:cNvPr id="251" name="Shape 251"/>
+        <p:cNvPr id="253" name="Shape 253"/>
         <p:cNvGrpSpPr/>
         <p:nvPr/>
       </p:nvGrpSpPr>
@@ -24866,7 +25037,7 @@
       </p:grpSpPr>
       <p:sp>
         <p:nvSpPr>
-          <p:cNvPr id="252" name="Google Shape;252;g36a36cb3e03_0_20"/>
+          <p:cNvPr id="254" name="Google Shape;254;g36a36cb3e03_0_20"/>
           <p:cNvSpPr txBox="1"/>
           <p:nvPr>
             <p:ph type="title"/>
@@ -24911,7 +25082,7 @@
       </p:sp>
       <p:sp>
         <p:nvSpPr>
-          <p:cNvPr id="253" name="Google Shape;253;g36a36cb3e03_0_20"/>
+          <p:cNvPr id="255" name="Google Shape;255;g36a36cb3e03_0_20"/>
           <p:cNvSpPr txBox="1"/>
           <p:nvPr>
             <p:ph idx="1" type="body"/>
@@ -25161,7 +25332,7 @@
       </p:sp>
       <p:sp>
         <p:nvSpPr>
-          <p:cNvPr id="254" name="Google Shape;254;g36a36cb3e03_0_20"/>
+          <p:cNvPr id="256" name="Google Shape;256;g36a36cb3e03_0_20"/>
           <p:cNvSpPr txBox="1"/>
           <p:nvPr>
             <p:ph idx="12" type="sldNum"/>
@@ -25216,7 +25387,7 @@
   <p:cSld>
     <p:spTree>
       <p:nvGrpSpPr>
-        <p:cNvPr id="258" name="Shape 258"/>
+        <p:cNvPr id="260" name="Shape 260"/>
         <p:cNvGrpSpPr/>
         <p:nvPr/>
       </p:nvGrpSpPr>
@@ -25230,7 +25401,7 @@
       </p:grpSpPr>
       <p:sp>
         <p:nvSpPr>
-          <p:cNvPr id="259" name="Google Shape;259;g36a36cb3e03_0_39"/>
+          <p:cNvPr id="261" name="Google Shape;261;g36a36cb3e03_0_39"/>
           <p:cNvSpPr txBox="1"/>
           <p:nvPr>
             <p:ph type="title"/>
@@ -25275,7 +25446,7 @@
       </p:sp>
       <p:sp>
         <p:nvSpPr>
-          <p:cNvPr id="260" name="Google Shape;260;g36a36cb3e03_0_39"/>
+          <p:cNvPr id="262" name="Google Shape;262;g36a36cb3e03_0_39"/>
           <p:cNvSpPr txBox="1"/>
           <p:nvPr>
             <p:ph idx="1" type="body"/>
@@ -25619,7 +25790,7 @@
       </p:sp>
       <p:sp>
         <p:nvSpPr>
-          <p:cNvPr id="261" name="Google Shape;261;g36a36cb3e03_0_39"/>
+          <p:cNvPr id="263" name="Google Shape;263;g36a36cb3e03_0_39"/>
           <p:cNvSpPr txBox="1"/>
           <p:nvPr>
             <p:ph idx="12" type="sldNum"/>
@@ -25674,7 +25845,7 @@
   <p:cSld>
     <p:spTree>
       <p:nvGrpSpPr>
-        <p:cNvPr id="265" name="Shape 265"/>
+        <p:cNvPr id="267" name="Shape 267"/>
         <p:cNvGrpSpPr/>
         <p:nvPr/>
       </p:nvGrpSpPr>
@@ -25688,7 +25859,7 @@
       </p:grpSpPr>
       <p:sp>
         <p:nvSpPr>
-          <p:cNvPr id="266" name="Google Shape;266;g36a36cb3e03_0_49"/>
+          <p:cNvPr id="268" name="Google Shape;268;g36a36cb3e03_0_49"/>
           <p:cNvSpPr txBox="1"/>
           <p:nvPr>
             <p:ph type="title"/>
@@ -25733,7 +25904,7 @@
       </p:sp>
       <p:sp>
         <p:nvSpPr>
-          <p:cNvPr id="267" name="Google Shape;267;g36a36cb3e03_0_49"/>
+          <p:cNvPr id="269" name="Google Shape;269;g36a36cb3e03_0_49"/>
           <p:cNvSpPr txBox="1"/>
           <p:nvPr>
             <p:ph idx="1" type="body"/>
@@ -26099,7 +26270,7 @@
       </p:sp>
       <p:sp>
         <p:nvSpPr>
-          <p:cNvPr id="268" name="Google Shape;268;g36a36cb3e03_0_49"/>
+          <p:cNvPr id="270" name="Google Shape;270;g36a36cb3e03_0_49"/>
           <p:cNvSpPr txBox="1"/>
           <p:nvPr>
             <p:ph idx="12" type="sldNum"/>
@@ -26154,7 +26325,7 @@
   <p:cSld>
     <p:spTree>
       <p:nvGrpSpPr>
-        <p:cNvPr id="272" name="Shape 272"/>
+        <p:cNvPr id="274" name="Shape 274"/>
         <p:cNvGrpSpPr/>
         <p:nvPr/>
       </p:nvGrpSpPr>
@@ -26168,7 +26339,7 @@
       </p:grpSpPr>
       <p:sp>
         <p:nvSpPr>
-          <p:cNvPr id="273" name="Google Shape;273;g36a36cb3e03_0_57"/>
+          <p:cNvPr id="275" name="Google Shape;275;g36a36cb3e03_0_57"/>
           <p:cNvSpPr txBox="1"/>
           <p:nvPr>
             <p:ph type="title"/>
@@ -26208,7 +26379,7 @@
       </p:sp>
       <p:sp>
         <p:nvSpPr>
-          <p:cNvPr id="274" name="Google Shape;274;g36a36cb3e03_0_57"/>
+          <p:cNvPr id="276" name="Google Shape;276;g36a36cb3e03_0_57"/>
           <p:cNvSpPr txBox="1"/>
           <p:nvPr>
             <p:ph idx="1" type="body"/>
@@ -26546,7 +26717,7 @@
       </p:sp>
       <p:sp>
         <p:nvSpPr>
-          <p:cNvPr id="275" name="Google Shape;275;g36a36cb3e03_0_57"/>
+          <p:cNvPr id="277" name="Google Shape;277;g36a36cb3e03_0_57"/>
           <p:cNvSpPr txBox="1"/>
           <p:nvPr>
             <p:ph idx="12" type="sldNum"/>
@@ -26601,7 +26772,7 @@
   <p:cSld>
     <p:spTree>
       <p:nvGrpSpPr>
-        <p:cNvPr id="279" name="Shape 279"/>
+        <p:cNvPr id="281" name="Shape 281"/>
         <p:cNvGrpSpPr/>
         <p:nvPr/>
       </p:nvGrpSpPr>
@@ -26615,7 +26786,7 @@
       </p:grpSpPr>
       <p:sp>
         <p:nvSpPr>
-          <p:cNvPr id="280" name="Google Shape;280;g36a36cb3e03_0_64"/>
+          <p:cNvPr id="282" name="Google Shape;282;g36a36cb3e03_0_64"/>
           <p:cNvSpPr txBox="1"/>
           <p:nvPr>
             <p:ph type="title"/>
@@ -26655,7 +26826,7 @@
       </p:sp>
       <p:sp>
         <p:nvSpPr>
-          <p:cNvPr id="281" name="Google Shape;281;g36a36cb3e03_0_64"/>
+          <p:cNvPr id="283" name="Google Shape;283;g36a36cb3e03_0_64"/>
           <p:cNvSpPr txBox="1"/>
           <p:nvPr>
             <p:ph idx="1" type="body"/>
@@ -26902,7 +27073,7 @@
       </p:sp>
       <p:sp>
         <p:nvSpPr>
-          <p:cNvPr id="282" name="Google Shape;282;g36a36cb3e03_0_64"/>
+          <p:cNvPr id="284" name="Google Shape;284;g36a36cb3e03_0_64"/>
           <p:cNvSpPr txBox="1"/>
           <p:nvPr>
             <p:ph idx="12" type="sldNum"/>
@@ -26957,7 +27128,7 @@
   <p:cSld>
     <p:spTree>
       <p:nvGrpSpPr>
-        <p:cNvPr id="286" name="Shape 286"/>
+        <p:cNvPr id="288" name="Shape 288"/>
         <p:cNvGrpSpPr/>
         <p:nvPr/>
       </p:nvGrpSpPr>
@@ -26971,7 +27142,7 @@
       </p:grpSpPr>
       <p:sp>
         <p:nvSpPr>
-          <p:cNvPr id="287" name="Google Shape;287;g36a36cb3e03_0_73"/>
+          <p:cNvPr id="289" name="Google Shape;289;g36a36cb3e03_0_73"/>
           <p:cNvSpPr txBox="1"/>
           <p:nvPr>
             <p:ph type="title"/>
@@ -27011,7 +27182,7 @@
       </p:sp>
       <p:sp>
         <p:nvSpPr>
-          <p:cNvPr id="288" name="Google Shape;288;g36a36cb3e03_0_73"/>
+          <p:cNvPr id="290" name="Google Shape;290;g36a36cb3e03_0_73"/>
           <p:cNvSpPr txBox="1"/>
           <p:nvPr>
             <p:ph idx="1" type="body"/>
@@ -27232,7 +27403,7 @@
       </p:sp>
       <p:sp>
         <p:nvSpPr>
-          <p:cNvPr id="289" name="Google Shape;289;g36a36cb3e03_0_73"/>
+          <p:cNvPr id="291" name="Google Shape;291;g36a36cb3e03_0_73"/>
           <p:cNvSpPr txBox="1"/>
           <p:nvPr>
             <p:ph idx="12" type="sldNum"/>
@@ -27287,7 +27458,7 @@
   <p:cSld>
     <p:spTree>
       <p:nvGrpSpPr>
-        <p:cNvPr id="293" name="Shape 293"/>
+        <p:cNvPr id="295" name="Shape 295"/>
         <p:cNvGrpSpPr/>
         <p:nvPr/>
       </p:nvGrpSpPr>
@@ -27301,7 +27472,7 @@
       </p:grpSpPr>
       <p:sp>
         <p:nvSpPr>
-          <p:cNvPr id="294" name="Google Shape;294;g36a36cb3e03_0_80"/>
+          <p:cNvPr id="296" name="Google Shape;296;g36a36cb3e03_0_80"/>
           <p:cNvSpPr txBox="1"/>
           <p:nvPr>
             <p:ph type="title"/>
@@ -27341,7 +27512,7 @@
       </p:sp>
       <p:sp>
         <p:nvSpPr>
-          <p:cNvPr id="295" name="Google Shape;295;g36a36cb3e03_0_80"/>
+          <p:cNvPr id="297" name="Google Shape;297;g36a36cb3e03_0_80"/>
           <p:cNvSpPr txBox="1"/>
           <p:nvPr>
             <p:ph idx="1" type="body"/>
@@ -27745,7 +27916,7 @@
       </p:sp>
       <p:sp>
         <p:nvSpPr>
-          <p:cNvPr id="296" name="Google Shape;296;g36a36cb3e03_0_80"/>
+          <p:cNvPr id="298" name="Google Shape;298;g36a36cb3e03_0_80"/>
           <p:cNvSpPr txBox="1"/>
           <p:nvPr>
             <p:ph idx="12" type="sldNum"/>
@@ -27789,7 +27960,7 @@
       </p:sp>
       <p:sp>
         <p:nvSpPr>
-          <p:cNvPr id="297" name="Google Shape;297;g36a36cb3e03_0_80"/>
+          <p:cNvPr id="299" name="Google Shape;299;g36a36cb3e03_0_80"/>
           <p:cNvSpPr txBox="1"/>
           <p:nvPr/>
         </p:nvSpPr>
@@ -28311,7 +28482,7 @@
   <p:cSld>
     <p:spTree>
       <p:nvGrpSpPr>
-        <p:cNvPr id="301" name="Shape 301"/>
+        <p:cNvPr id="303" name="Shape 303"/>
         <p:cNvGrpSpPr/>
         <p:nvPr/>
       </p:nvGrpSpPr>
@@ -28325,7 +28496,7 @@
       </p:grpSpPr>
       <p:sp>
         <p:nvSpPr>
-          <p:cNvPr id="302" name="Google Shape;302;g36a36cb3e03_0_90"/>
+          <p:cNvPr id="304" name="Google Shape;304;g36a36cb3e03_0_90"/>
           <p:cNvSpPr txBox="1"/>
           <p:nvPr>
             <p:ph type="title"/>
@@ -28365,7 +28536,7 @@
       </p:sp>
       <p:sp>
         <p:nvSpPr>
-          <p:cNvPr id="303" name="Google Shape;303;g36a36cb3e03_0_90"/>
+          <p:cNvPr id="305" name="Google Shape;305;g36a36cb3e03_0_90"/>
           <p:cNvSpPr txBox="1"/>
           <p:nvPr>
             <p:ph idx="1" type="body"/>
@@ -28655,7 +28826,7 @@
       </p:sp>
       <p:sp>
         <p:nvSpPr>
-          <p:cNvPr id="304" name="Google Shape;304;g36a36cb3e03_0_90"/>
+          <p:cNvPr id="306" name="Google Shape;306;g36a36cb3e03_0_90"/>
           <p:cNvSpPr txBox="1"/>
           <p:nvPr>
             <p:ph idx="12" type="sldNum"/>
@@ -28699,7 +28870,7 @@
       </p:sp>
       <p:sp>
         <p:nvSpPr>
-          <p:cNvPr id="305" name="Google Shape;305;g36a36cb3e03_0_90"/>
+          <p:cNvPr id="307" name="Google Shape;307;g36a36cb3e03_0_90"/>
           <p:cNvSpPr/>
           <p:nvPr/>
         </p:nvSpPr>
@@ -28777,7 +28948,7 @@
       </p:sp>
       <p:sp>
         <p:nvSpPr>
-          <p:cNvPr id="306" name="Google Shape;306;g36a36cb3e03_0_90"/>
+          <p:cNvPr id="308" name="Google Shape;308;g36a36cb3e03_0_90"/>
           <p:cNvSpPr/>
           <p:nvPr/>
         </p:nvSpPr>
@@ -28855,7 +29026,7 @@
       </p:sp>
       <p:sp>
         <p:nvSpPr>
-          <p:cNvPr id="307" name="Google Shape;307;g36a36cb3e03_0_90"/>
+          <p:cNvPr id="309" name="Google Shape;309;g36a36cb3e03_0_90"/>
           <p:cNvSpPr/>
           <p:nvPr/>
         </p:nvSpPr>
@@ -28933,7 +29104,7 @@
       </p:sp>
       <p:sp>
         <p:nvSpPr>
-          <p:cNvPr id="308" name="Google Shape;308;g36a36cb3e03_0_90"/>
+          <p:cNvPr id="310" name="Google Shape;310;g36a36cb3e03_0_90"/>
           <p:cNvSpPr/>
           <p:nvPr/>
         </p:nvSpPr>
@@ -29281,7 +29452,7 @@
   <p:cSld>
     <p:spTree>
       <p:nvGrpSpPr>
-        <p:cNvPr id="312" name="Shape 312"/>
+        <p:cNvPr id="314" name="Shape 314"/>
         <p:cNvGrpSpPr/>
         <p:nvPr/>
       </p:nvGrpSpPr>
@@ -29295,7 +29466,7 @@
       </p:grpSpPr>
       <p:sp>
         <p:nvSpPr>
-          <p:cNvPr id="313" name="Google Shape;313;p9"/>
+          <p:cNvPr id="315" name="Google Shape;315;p9"/>
           <p:cNvSpPr txBox="1"/>
           <p:nvPr>
             <p:ph type="title"/>
@@ -29357,7 +29528,7 @@
       </p:sp>
       <p:sp>
         <p:nvSpPr>
-          <p:cNvPr id="314" name="Google Shape;314;p9"/>
+          <p:cNvPr id="316" name="Google Shape;316;p9"/>
           <p:cNvSpPr txBox="1"/>
           <p:nvPr>
             <p:ph idx="1" type="body"/>
@@ -29789,7 +29960,7 @@
       </p:sp>
       <p:sp>
         <p:nvSpPr>
-          <p:cNvPr id="315" name="Google Shape;315;p9"/>
+          <p:cNvPr id="317" name="Google Shape;317;p9"/>
           <p:cNvSpPr txBox="1"/>
           <p:nvPr>
             <p:ph idx="12" type="sldNum"/>
@@ -29829,7 +30000,7 @@
       </p:sp>
       <p:sp>
         <p:nvSpPr>
-          <p:cNvPr id="316" name="Google Shape;316;p9"/>
+          <p:cNvPr id="318" name="Google Shape;318;p9"/>
           <p:cNvSpPr txBox="1"/>
           <p:nvPr/>
         </p:nvSpPr>
@@ -29959,7 +30130,7 @@
   <p:cSld>
     <p:spTree>
       <p:nvGrpSpPr>
-        <p:cNvPr id="320" name="Shape 320"/>
+        <p:cNvPr id="322" name="Shape 322"/>
         <p:cNvGrpSpPr/>
         <p:nvPr/>
       </p:nvGrpSpPr>
@@ -29973,7 +30144,7 @@
       </p:grpSpPr>
       <p:sp>
         <p:nvSpPr>
-          <p:cNvPr id="321" name="Google Shape;321;p10"/>
+          <p:cNvPr id="323" name="Google Shape;323;p10"/>
           <p:cNvSpPr txBox="1"/>
           <p:nvPr>
             <p:ph type="title"/>
@@ -30035,7 +30206,7 @@
       </p:sp>
       <p:sp>
         <p:nvSpPr>
-          <p:cNvPr id="322" name="Google Shape;322;p10"/>
+          <p:cNvPr id="324" name="Google Shape;324;p10"/>
           <p:cNvSpPr txBox="1"/>
           <p:nvPr>
             <p:ph idx="12" type="sldNum"/>
@@ -30075,7 +30246,7 @@
       </p:sp>
       <p:sp>
         <p:nvSpPr>
-          <p:cNvPr id="323" name="Google Shape;323;p10"/>
+          <p:cNvPr id="325" name="Google Shape;325;p10"/>
           <p:cNvSpPr txBox="1"/>
           <p:nvPr/>
         </p:nvSpPr>
@@ -30521,7 +30692,7 @@
   <p:cSld>
     <p:spTree>
       <p:nvGrpSpPr>
-        <p:cNvPr id="327" name="Shape 327"/>
+        <p:cNvPr id="329" name="Shape 329"/>
         <p:cNvGrpSpPr/>
         <p:nvPr/>
       </p:nvGrpSpPr>
@@ -30535,7 +30706,7 @@
       </p:grpSpPr>
       <p:sp>
         <p:nvSpPr>
-          <p:cNvPr id="328" name="Google Shape;328;p11"/>
+          <p:cNvPr id="330" name="Google Shape;330;p11"/>
           <p:cNvSpPr txBox="1"/>
           <p:nvPr>
             <p:ph type="title"/>
@@ -30597,7 +30768,7 @@
       </p:sp>
       <p:sp>
         <p:nvSpPr>
-          <p:cNvPr id="329" name="Google Shape;329;p11"/>
+          <p:cNvPr id="331" name="Google Shape;331;p11"/>
           <p:cNvSpPr txBox="1"/>
           <p:nvPr>
             <p:ph idx="12" type="sldNum"/>
@@ -30637,7 +30808,7 @@
       </p:sp>
       <p:sp>
         <p:nvSpPr>
-          <p:cNvPr id="330" name="Google Shape;330;p11"/>
+          <p:cNvPr id="332" name="Google Shape;332;p11"/>
           <p:cNvSpPr txBox="1"/>
           <p:nvPr/>
         </p:nvSpPr>
@@ -31098,7 +31269,7 @@
   <p:cSld>
     <p:spTree>
       <p:nvGrpSpPr>
-        <p:cNvPr id="334" name="Shape 334"/>
+        <p:cNvPr id="336" name="Shape 336"/>
         <p:cNvGrpSpPr/>
         <p:nvPr/>
       </p:nvGrpSpPr>
@@ -31112,7 +31283,7 @@
       </p:grpSpPr>
       <p:sp>
         <p:nvSpPr>
-          <p:cNvPr id="335" name="Google Shape;335;g36a36cb3e03_0_115"/>
+          <p:cNvPr id="337" name="Google Shape;337;g36a36cb3e03_0_115"/>
           <p:cNvSpPr txBox="1"/>
           <p:nvPr>
             <p:ph type="title"/>
@@ -31162,7 +31333,7 @@
       </p:sp>
       <p:sp>
         <p:nvSpPr>
-          <p:cNvPr id="336" name="Google Shape;336;g36a36cb3e03_0_115"/>
+          <p:cNvPr id="338" name="Google Shape;338;g36a36cb3e03_0_115"/>
           <p:cNvSpPr txBox="1"/>
           <p:nvPr>
             <p:ph idx="1" type="body"/>
@@ -31471,7 +31642,7 @@
       </p:sp>
       <p:sp>
         <p:nvSpPr>
-          <p:cNvPr id="337" name="Google Shape;337;g36a36cb3e03_0_115"/>
+          <p:cNvPr id="339" name="Google Shape;339;g36a36cb3e03_0_115"/>
           <p:cNvSpPr txBox="1"/>
           <p:nvPr>
             <p:ph idx="12" type="sldNum"/>
@@ -31526,7 +31697,7 @@
   <p:cSld>
     <p:spTree>
       <p:nvGrpSpPr>
-        <p:cNvPr id="341" name="Shape 341"/>
+        <p:cNvPr id="343" name="Shape 343"/>
         <p:cNvGrpSpPr/>
         <p:nvPr/>
       </p:nvGrpSpPr>
@@ -31540,7 +31711,7 @@
       </p:grpSpPr>
       <p:sp>
         <p:nvSpPr>
-          <p:cNvPr id="342" name="Google Shape;342;p13"/>
+          <p:cNvPr id="344" name="Google Shape;344;p13"/>
           <p:cNvSpPr txBox="1"/>
           <p:nvPr>
             <p:ph type="title"/>
@@ -31602,7 +31773,7 @@
       </p:sp>
       <p:sp>
         <p:nvSpPr>
-          <p:cNvPr id="343" name="Google Shape;343;p13"/>
+          <p:cNvPr id="345" name="Google Shape;345;p13"/>
           <p:cNvSpPr txBox="1"/>
           <p:nvPr>
             <p:ph idx="1" type="body"/>
@@ -31766,7 +31937,7 @@
       </p:sp>
       <p:sp>
         <p:nvSpPr>
-          <p:cNvPr id="344" name="Google Shape;344;p13"/>
+          <p:cNvPr id="346" name="Google Shape;346;p13"/>
           <p:cNvSpPr txBox="1"/>
           <p:nvPr>
             <p:ph idx="12" type="sldNum"/>
@@ -31817,7 +31988,7 @@
   <p:cSld>
     <p:spTree>
       <p:nvGrpSpPr>
-        <p:cNvPr id="348" name="Shape 348"/>
+        <p:cNvPr id="350" name="Shape 350"/>
         <p:cNvGrpSpPr/>
         <p:nvPr/>
       </p:nvGrpSpPr>
@@ -31831,7 +32002,7 @@
       </p:grpSpPr>
       <p:sp>
         <p:nvSpPr>
-          <p:cNvPr id="349" name="Google Shape;349;p14"/>
+          <p:cNvPr id="351" name="Google Shape;351;p14"/>
           <p:cNvSpPr txBox="1"/>
           <p:nvPr>
             <p:ph type="title"/>
@@ -31893,7 +32064,7 @@
       </p:sp>
       <p:sp>
         <p:nvSpPr>
-          <p:cNvPr id="350" name="Google Shape;350;p14"/>
+          <p:cNvPr id="352" name="Google Shape;352;p14"/>
           <p:cNvSpPr txBox="1"/>
           <p:nvPr>
             <p:ph idx="1" type="body"/>
@@ -32057,7 +32228,7 @@
       </p:sp>
       <p:sp>
         <p:nvSpPr>
-          <p:cNvPr id="351" name="Google Shape;351;p14"/>
+          <p:cNvPr id="353" name="Google Shape;353;p14"/>
           <p:cNvSpPr txBox="1"/>
           <p:nvPr>
             <p:ph idx="12" type="sldNum"/>

</xml_diff>